<commit_message>
Added homework for 02. NodeJS-Web-Server
</commit_message>
<xml_diff>
--- a/02. NodeJS-Web-Server/NodeJS-Web-Server.pptx
+++ b/02. NodeJS-Web-Server/NodeJS-Web-Server.pptx
@@ -5,7 +5,7 @@
     <p:sldMasterId id="2147483660" r:id="rId1"/>
   </p:sldMasterIdLst>
   <p:notesMasterIdLst>
-    <p:notesMasterId r:id="rId30"/>
+    <p:notesMasterId r:id="rId29"/>
   </p:notesMasterIdLst>
   <p:sldIdLst>
     <p:sldId id="256" r:id="rId2"/>
@@ -35,7 +35,6 @@
     <p:sldId id="338" r:id="rId26"/>
     <p:sldId id="317" r:id="rId27"/>
     <p:sldId id="318" r:id="rId28"/>
-    <p:sldId id="339" r:id="rId29"/>
   </p:sldIdLst>
   <p:sldSz cx="9144000" cy="6858000" type="screen4x3"/>
   <p:notesSz cx="6858000" cy="9144000"/>
@@ -186,7 +185,6 @@
           <p14:sldIdLst>
             <p14:sldId id="317"/>
             <p14:sldId id="318"/>
-            <p14:sldId id="339"/>
           </p14:sldIdLst>
         </p14:section>
       </p14:sectionLst>
@@ -291,7 +289,7 @@
           <a:p>
             <a:fld id="{464D2B2C-C7F1-41AD-AFF3-6EECE3377837}" type="datetimeFigureOut">
               <a:rPr lang="en-US" smtClean="0"/>
-              <a:t>9/30/2014</a:t>
+              <a:t>1/3/2016</a:t>
             </a:fld>
             <a:endParaRPr lang="en-US"/>
           </a:p>
@@ -854,146 +852,6 @@
     <p:extLst>
       <p:ext uri="{BB962C8B-B14F-4D97-AF65-F5344CB8AC3E}">
         <p14:creationId xmlns:p14="http://schemas.microsoft.com/office/powerpoint/2010/main" val="521281981"/>
-      </p:ext>
-    </p:extLst>
-  </p:cSld>
-  <p:clrMapOvr>
-    <a:masterClrMapping/>
-  </p:clrMapOvr>
-</p:notes>
-</file>
-
-<file path=ppt/notesSlides/notesSlide3.xml><?xml version="1.0" encoding="utf-8"?>
-<p:notes xmlns:a="http://schemas.openxmlformats.org/drawingml/2006/main" xmlns:r="http://schemas.openxmlformats.org/officeDocument/2006/relationships" xmlns:p="http://schemas.openxmlformats.org/presentationml/2006/main">
-  <p:cSld>
-    <p:spTree>
-      <p:nvGrpSpPr>
-        <p:cNvPr id="1" name=""/>
-        <p:cNvGrpSpPr/>
-        <p:nvPr/>
-      </p:nvGrpSpPr>
-      <p:grpSpPr>
-        <a:xfrm>
-          <a:off x="0" y="0"/>
-          <a:ext cx="0" cy="0"/>
-          <a:chOff x="0" y="0"/>
-          <a:chExt cx="0" cy="0"/>
-        </a:xfrm>
-      </p:grpSpPr>
-      <p:sp>
-        <p:nvSpPr>
-          <p:cNvPr id="4" name="Rectangle 2"/>
-          <p:cNvSpPr>
-            <a:spLocks noGrp="1" noChangeArrowheads="1"/>
-          </p:cNvSpPr>
-          <p:nvPr>
-            <p:ph type="hdr" sz="quarter"/>
-          </p:nvPr>
-        </p:nvSpPr>
-        <p:spPr>
-          <a:ln/>
-        </p:spPr>
-        <p:txBody>
-          <a:bodyPr/>
-          <a:lstStyle/>
-          <a:p>
-            <a:r>
-              <a:rPr lang="en-US" dirty="0"/>
-              <a:t>*</a:t>
-            </a:r>
-          </a:p>
-        </p:txBody>
-      </p:sp>
-      <p:sp>
-        <p:nvSpPr>
-          <p:cNvPr id="5" name="Rectangle 6"/>
-          <p:cNvSpPr>
-            <a:spLocks noGrp="1" noChangeArrowheads="1"/>
-          </p:cNvSpPr>
-          <p:nvPr>
-            <p:ph type="ftr" sz="quarter" idx="4"/>
-          </p:nvPr>
-        </p:nvSpPr>
-        <p:spPr>
-          <a:ln/>
-        </p:spPr>
-        <p:txBody>
-          <a:bodyPr/>
-          <a:lstStyle/>
-          <a:p>
-            <a:r>
-              <a:rPr lang="en-US" dirty="0"/>
-              <a:t>(c) 2007 National Academy for Software Development - http://academy.devbg.org. All rights reserved. Unauthorized copying or re-distribution is strictly prohibited.*</a:t>
-            </a:r>
-          </a:p>
-        </p:txBody>
-      </p:sp>
-      <p:sp>
-        <p:nvSpPr>
-          <p:cNvPr id="6" name="Rectangle 7"/>
-          <p:cNvSpPr>
-            <a:spLocks noGrp="1" noChangeArrowheads="1"/>
-          </p:cNvSpPr>
-          <p:nvPr>
-            <p:ph type="sldNum" sz="quarter" idx="5"/>
-          </p:nvPr>
-        </p:nvSpPr>
-        <p:spPr>
-          <a:ln/>
-        </p:spPr>
-        <p:txBody>
-          <a:bodyPr/>
-          <a:lstStyle/>
-          <a:p>
-            <a:fld id="{46CA27F0-F98F-4030-AB22-9BA0D7A117D7}" type="slidenum">
-              <a:rPr lang="en-US"/>
-              <a:pPr/>
-              <a:t>28</a:t>
-            </a:fld>
-            <a:r>
-              <a:rPr lang="en-US" dirty="0"/>
-              <a:t>##</a:t>
-            </a:r>
-          </a:p>
-        </p:txBody>
-      </p:sp>
-      <p:sp>
-        <p:nvSpPr>
-          <p:cNvPr id="427010" name="Rectangle 2"/>
-          <p:cNvSpPr>
-            <a:spLocks noGrp="1" noRot="1" noChangeAspect="1" noChangeArrowheads="1" noTextEdit="1"/>
-          </p:cNvSpPr>
-          <p:nvPr>
-            <p:ph type="sldImg"/>
-          </p:nvPr>
-        </p:nvSpPr>
-        <p:spPr>
-          <a:ln/>
-        </p:spPr>
-      </p:sp>
-      <p:sp>
-        <p:nvSpPr>
-          <p:cNvPr id="427011" name="Rectangle 3"/>
-          <p:cNvSpPr>
-            <a:spLocks noGrp="1" noChangeArrowheads="1"/>
-          </p:cNvSpPr>
-          <p:nvPr>
-            <p:ph type="body" idx="1"/>
-          </p:nvPr>
-        </p:nvSpPr>
-        <p:spPr/>
-        <p:txBody>
-          <a:bodyPr/>
-          <a:lstStyle/>
-          <a:p>
-            <a:endParaRPr lang="bg-BG"/>
-          </a:p>
-        </p:txBody>
-      </p:sp>
-    </p:spTree>
-    <p:extLst>
-      <p:ext uri="{BB962C8B-B14F-4D97-AF65-F5344CB8AC3E}">
-        <p14:creationId xmlns:p14="http://schemas.microsoft.com/office/powerpoint/2010/main" val="2182475974"/>
       </p:ext>
     </p:extLst>
   </p:cSld>
@@ -7421,11 +7279,7 @@
           <a:p>
             <a:r>
               <a:rPr lang="en-US" dirty="0" smtClean="0"/>
-              <a:t>Basic server </a:t>
-            </a:r>
-            <a:r>
-              <a:rPr lang="en-US" dirty="0" smtClean="0"/>
-              <a:t>implementation</a:t>
+              <a:t>Basic server implementation</a:t>
             </a:r>
           </a:p>
           <a:p>
@@ -8126,11 +7980,7 @@
             </a:r>
             <a:r>
               <a:rPr lang="en-US" dirty="0" smtClean="0"/>
-              <a:t> </a:t>
-            </a:r>
-            <a:r>
-              <a:rPr lang="en-US" dirty="0" smtClean="0"/>
-              <a:t>class [</a:t>
+              <a:t> class [</a:t>
             </a:r>
             <a:r>
               <a:rPr lang="en-US" dirty="0" smtClean="0">
@@ -8147,11 +7997,7 @@
             <a:pPr lvl="1"/>
             <a:r>
               <a:rPr lang="en-US" dirty="0" smtClean="0"/>
-              <a:t>Implements </a:t>
-            </a:r>
-            <a:r>
-              <a:rPr lang="en-US" dirty="0" smtClean="0"/>
-              <a:t>the </a:t>
+              <a:t>Implements the </a:t>
             </a:r>
             <a:r>
               <a:rPr lang="en-US" dirty="0" smtClean="0">
@@ -8273,11 +8119,7 @@
             </a:r>
             <a:r>
               <a:rPr lang="en-US" dirty="0" smtClean="0"/>
-              <a:t>– the URL of the </a:t>
-            </a:r>
-            <a:r>
-              <a:rPr lang="en-US" dirty="0" smtClean="0"/>
-              <a:t>request</a:t>
+              <a:t>– the URL of the request</a:t>
             </a:r>
           </a:p>
         </p:txBody>
@@ -8551,11 +8393,7 @@
           <a:p>
             <a:r>
               <a:rPr lang="en-US" dirty="0" smtClean="0"/>
-              <a:t>The Response </a:t>
-            </a:r>
-            <a:r>
-              <a:rPr lang="en-US" dirty="0" smtClean="0"/>
-              <a:t>wrapper</a:t>
+              <a:t>The Response wrapper</a:t>
             </a:r>
           </a:p>
           <a:p>
@@ -8590,11 +8428,7 @@
             <a:pPr lvl="1"/>
             <a:r>
               <a:rPr lang="en-US" dirty="0" smtClean="0"/>
-              <a:t>Implements </a:t>
-            </a:r>
-            <a:r>
-              <a:rPr lang="en-US" dirty="0" smtClean="0"/>
-              <a:t>the </a:t>
+              <a:t>Implements the </a:t>
             </a:r>
             <a:r>
               <a:rPr lang="en-US" dirty="0" smtClean="0">
@@ -9627,19 +9461,7 @@
             </a:pPr>
             <a:r>
               <a:rPr lang="en-US" dirty="0" smtClean="0"/>
-              <a:t>What </a:t>
-            </a:r>
-            <a:r>
-              <a:rPr lang="en-US" dirty="0" smtClean="0"/>
-              <a:t>is </a:t>
-            </a:r>
-            <a:r>
-              <a:rPr lang="en-US" dirty="0" smtClean="0"/>
-              <a:t>a Web </a:t>
-            </a:r>
-            <a:r>
-              <a:rPr lang="en-US" dirty="0" smtClean="0"/>
-              <a:t>Server</a:t>
+              <a:t>What is a Web Server</a:t>
             </a:r>
           </a:p>
           <a:p>
@@ -11663,155 +11485,6 @@
   <p:clrMapOvr>
     <a:masterClrMapping/>
   </p:clrMapOvr>
-  <p:timing>
-    <p:tnLst>
-      <p:par>
-        <p:cTn id="1" dur="indefinite" restart="never" nodeType="tmRoot"/>
-      </p:par>
-    </p:tnLst>
-  </p:timing>
-</p:sld>
-</file>
-
-<file path=ppt/slides/slide28.xml><?xml version="1.0" encoding="utf-8"?>
-<p:sld xmlns:a="http://schemas.openxmlformats.org/drawingml/2006/main" xmlns:r="http://schemas.openxmlformats.org/officeDocument/2006/relationships" xmlns:p="http://schemas.openxmlformats.org/presentationml/2006/main">
-  <p:cSld>
-    <p:spTree>
-      <p:nvGrpSpPr>
-        <p:cNvPr id="1" name=""/>
-        <p:cNvGrpSpPr/>
-        <p:nvPr/>
-      </p:nvGrpSpPr>
-      <p:grpSpPr>
-        <a:xfrm>
-          <a:off x="0" y="0"/>
-          <a:ext cx="0" cy="0"/>
-          <a:chOff x="0" y="0"/>
-          <a:chExt cx="0" cy="0"/>
-        </a:xfrm>
-      </p:grpSpPr>
-      <p:sp>
-        <p:nvSpPr>
-          <p:cNvPr id="425986" name="Rectangle 2"/>
-          <p:cNvSpPr>
-            <a:spLocks noGrp="1" noChangeArrowheads="1"/>
-          </p:cNvSpPr>
-          <p:nvPr>
-            <p:ph type="title"/>
-          </p:nvPr>
-        </p:nvSpPr>
-        <p:spPr/>
-        <p:txBody>
-          <a:bodyPr/>
-          <a:lstStyle/>
-          <a:p>
-            <a:r>
-              <a:rPr lang="en-US"/>
-              <a:t>Exercises</a:t>
-            </a:r>
-            <a:endParaRPr lang="bg-BG"/>
-          </a:p>
-        </p:txBody>
-      </p:sp>
-      <p:sp>
-        <p:nvSpPr>
-          <p:cNvPr id="425987" name="Rectangle 3"/>
-          <p:cNvSpPr>
-            <a:spLocks noGrp="1" noChangeArrowheads="1"/>
-          </p:cNvSpPr>
-          <p:nvPr>
-            <p:ph type="body" idx="1"/>
-          </p:nvPr>
-        </p:nvSpPr>
-        <p:spPr>
-          <a:xfrm>
-            <a:off x="228600" y="771277"/>
-            <a:ext cx="8686800" cy="5791200"/>
-          </a:xfrm>
-        </p:spPr>
-        <p:txBody>
-          <a:bodyPr/>
-          <a:lstStyle/>
-          <a:p>
-            <a:pPr marL="514350" indent="-514350">
-              <a:buFont typeface="+mj-lt"/>
-              <a:buAutoNum type="arabicPeriod"/>
-            </a:pPr>
-            <a:r>
-              <a:rPr lang="en-US" sz="2800" dirty="0" smtClean="0"/>
-              <a:t>Create file upload web site with </a:t>
-            </a:r>
-            <a:r>
-              <a:rPr lang="en-US" sz="2800" dirty="0" err="1" smtClean="0"/>
-              <a:t>NodeJS</a:t>
-            </a:r>
-            <a:r>
-              <a:rPr lang="en-US" sz="2800" dirty="0" smtClean="0"/>
-              <a:t>. You should have the option to upload a file and be given an unique URL for its download. Use GUID.</a:t>
-            </a:r>
-          </a:p>
-          <a:p>
-            <a:pPr marL="862013" lvl="1" indent="-514350"/>
-            <a:r>
-              <a:rPr lang="en-US" sz="2600" b="0" dirty="0" smtClean="0"/>
-              <a:t>You are not allowed to use </a:t>
-            </a:r>
-            <a:r>
-              <a:rPr lang="en-US" sz="2600" b="0" smtClean="0"/>
-              <a:t>ExpressJS</a:t>
-            </a:r>
-            <a:endParaRPr lang="en-US" sz="2600" b="0" dirty="0"/>
-          </a:p>
-        </p:txBody>
-      </p:sp>
-      <p:sp>
-        <p:nvSpPr>
-          <p:cNvPr id="4" name="Slide Number Placeholder 3"/>
-          <p:cNvSpPr>
-            <a:spLocks noGrp="1"/>
-          </p:cNvSpPr>
-          <p:nvPr>
-            <p:ph type="sldNum" sz="quarter" idx="4294967295"/>
-          </p:nvPr>
-        </p:nvSpPr>
-        <p:spPr>
-          <a:xfrm>
-            <a:off x="8686800" y="6553200"/>
-            <a:ext cx="457200" cy="228600"/>
-          </a:xfrm>
-          <a:prstGeom prst="rect">
-            <a:avLst/>
-          </a:prstGeom>
-        </p:spPr>
-        <p:txBody>
-          <a:bodyPr/>
-          <a:lstStyle/>
-          <a:p>
-            <a:pPr>
-              <a:defRPr/>
-            </a:pPr>
-            <a:fld id="{58452FF4-89E3-4D1B-9927-2DBDC00E58D7}" type="slidenum">
-              <a:rPr lang="en-US" smtClean="0"/>
-              <a:pPr>
-                <a:defRPr/>
-              </a:pPr>
-              <a:t>28</a:t>
-            </a:fld>
-            <a:endParaRPr lang="en-US" dirty="0"/>
-          </a:p>
-        </p:txBody>
-      </p:sp>
-    </p:spTree>
-    <p:extLst>
-      <p:ext uri="{BB962C8B-B14F-4D97-AF65-F5344CB8AC3E}">
-        <p14:creationId xmlns:p14="http://schemas.microsoft.com/office/powerpoint/2010/main" val="4023655438"/>
-      </p:ext>
-    </p:extLst>
-  </p:cSld>
-  <p:clrMapOvr>
-    <a:masterClrMapping/>
-  </p:clrMapOvr>
-  <p:transition/>
   <p:timing>
     <p:tnLst>
       <p:par>
@@ -13480,11 +13153,11 @@
   <p:clrMapOvr>
     <a:masterClrMapping/>
   </p:clrMapOvr>
-  <mc:AlternateContent xmlns:mc="http://schemas.openxmlformats.org/markup-compatibility/2006">
-    <mc:Choice xmlns:p14="http://schemas.microsoft.com/office/powerpoint/2010/main" Requires="p14">
+  <mc:AlternateContent xmlns:mc="http://schemas.openxmlformats.org/markup-compatibility/2006" xmlns:p14="http://schemas.microsoft.com/office/powerpoint/2010/main">
+    <mc:Choice Requires="p14">
       <p:transition spd="slow" p14:dur="2000"/>
     </mc:Choice>
-    <mc:Fallback>
+    <mc:Fallback xmlns="">
       <p:transition spd="slow"/>
     </mc:Fallback>
   </mc:AlternateContent>
@@ -15141,15 +14814,7 @@
           <a:p>
             <a:r>
               <a:rPr lang="en-US" dirty="0" smtClean="0"/>
-              <a:t>These requests are redirected to other software products (ASP.NET, </a:t>
-            </a:r>
-            <a:r>
-              <a:rPr lang="en-US" dirty="0" smtClean="0"/>
-              <a:t>PHP, </a:t>
-            </a:r>
-            <a:r>
-              <a:rPr lang="en-US" dirty="0" smtClean="0"/>
-              <a:t>etc.), depending on the web server settings</a:t>
+              <a:t>These requests are redirected to other software products (ASP.NET, PHP, etc.), depending on the web server settings</a:t>
             </a:r>
           </a:p>
           <a:p>

</xml_diff>